<commit_message>
Se actualizo el archivo readme colocando la liga del github
</commit_message>
<xml_diff>
--- a/Presentacion final y producto final/precentacion del proyecto de aseguramiento.pptx
+++ b/Presentacion final y producto final/precentacion del proyecto de aseguramiento.pptx
@@ -19206,7 +19206,7 @@
         </p:spPr>
         <p:txBody>
           <a:bodyPr spcFirstLastPara="1" wrap="square" lIns="91425" tIns="45700" rIns="91425" bIns="45700" anchor="t" anchorCtr="0">
-            <a:normAutofit fontScale="70000" lnSpcReduction="20000"/>
+            <a:normAutofit fontScale="62500" lnSpcReduction="20000"/>
           </a:bodyPr>
           <a:lstStyle/>
           <a:p>
@@ -19375,33 +19375,63 @@
               <a:buSzPct val="115000"/>
             </a:pPr>
             <a:r>
-              <a:rPr lang="es-MX" u="sng" dirty="0" err="1">
+              <a:rPr lang="es-MX" dirty="0" err="1">
                 <a:hlinkClick r:id="rId8"/>
               </a:rPr>
               <a:t>JoelAlBe</a:t>
             </a:r>
             <a:r>
-              <a:rPr lang="es-MX" u="sng" dirty="0">
+              <a:rPr lang="es-MX" dirty="0">
                 <a:hlinkClick r:id="rId8"/>
               </a:rPr>
-              <a:t> (github.com)</a:t>
+              <a:t>/</a:t>
             </a:r>
-            <a:endParaRPr dirty="0"/>
+            <a:r>
+              <a:rPr lang="es-MX" dirty="0" err="1">
+                <a:hlinkClick r:id="rId8"/>
+              </a:rPr>
+              <a:t>HistorialClinico</a:t>
+            </a:r>
+            <a:r>
+              <a:rPr lang="es-MX" dirty="0">
+                <a:hlinkClick r:id="rId8"/>
+              </a:rPr>
+              <a:t>: Programa a nivel de universidad de la gestión de historiales clínicos para la materia de aseguramiento y calidad del software en lenguaje java y su documentación. </a:t>
+            </a:r>
+            <a:r>
+              <a:rPr lang="es-MX">
+                <a:hlinkClick r:id="rId8"/>
+              </a:rPr>
+              <a:t>(</a:t>
+            </a:r>
+            <a:r>
+              <a:rPr lang="es-MX">
+                <a:hlinkClick r:id="rId8"/>
+              </a:rPr>
+              <a:t>github.com</a:t>
+            </a:r>
+            <a:r>
+              <a:rPr lang="es-MX" smtClean="0">
+                <a:hlinkClick r:id="rId8"/>
+              </a:rPr>
+              <a:t>)</a:t>
+            </a:r>
+            <a:endParaRPr lang="es-MX" smtClean="0"/>
           </a:p>
           <a:p>
-            <a:pPr marL="285750" lvl="0" indent="-220027" algn="l" rtl="0">
+            <a:pPr marL="285750" lvl="0" indent="-220027">
               <a:spcBef>
                 <a:spcPts val="1080"/>
               </a:spcBef>
-              <a:spcAft>
-                <a:spcPts val="0"/>
-              </a:spcAft>
               <a:buSzPct val="115000"/>
-              <a:buChar char="•"/>
             </a:pPr>
             <a:r>
+              <a:rPr lang="es-MX" smtClean="0"/>
+              <a:t>Enlace </a:t>
+            </a:r>
+            <a:r>
               <a:rPr lang="es-MX" dirty="0"/>
-              <a:t>Enlace del repositorio </a:t>
+              <a:t>del repositorio </a:t>
             </a:r>
             <a:r>
               <a:rPr lang="es-MX" dirty="0" err="1"/>
@@ -20562,14 +20592,14 @@
                 <a:gridCol w="1197725">
                   <a:extLst>
                     <a:ext uri="{9D8B030D-6E8A-4147-A177-3AD203B41FA5}">
-                      <a16:colId xmlns:a16="http://schemas.microsoft.com/office/drawing/2014/main" xmlns="" val="20000"/>
+                      <a16:colId xmlns="" xmlns:a16="http://schemas.microsoft.com/office/drawing/2014/main" val="20000"/>
                     </a:ext>
                   </a:extLst>
                 </a:gridCol>
                 <a:gridCol w="3271225">
                   <a:extLst>
                     <a:ext uri="{9D8B030D-6E8A-4147-A177-3AD203B41FA5}">
-                      <a16:colId xmlns:a16="http://schemas.microsoft.com/office/drawing/2014/main" xmlns="" val="20001"/>
+                      <a16:colId xmlns="" xmlns:a16="http://schemas.microsoft.com/office/drawing/2014/main" val="20001"/>
                     </a:ext>
                   </a:extLst>
                 </a:gridCol>
@@ -20623,7 +20653,7 @@
                 </a:tc>
                 <a:extLst>
                   <a:ext uri="{0D108BD9-81ED-4DB2-BD59-A6C34878D82A}">
-                    <a16:rowId xmlns:a16="http://schemas.microsoft.com/office/drawing/2014/main" xmlns="" val="10000"/>
+                    <a16:rowId xmlns="" xmlns:a16="http://schemas.microsoft.com/office/drawing/2014/main" val="10000"/>
                   </a:ext>
                 </a:extLst>
               </a:tr>
@@ -20676,7 +20706,7 @@
                 </a:tc>
                 <a:extLst>
                   <a:ext uri="{0D108BD9-81ED-4DB2-BD59-A6C34878D82A}">
-                    <a16:rowId xmlns:a16="http://schemas.microsoft.com/office/drawing/2014/main" xmlns="" val="10001"/>
+                    <a16:rowId xmlns="" xmlns:a16="http://schemas.microsoft.com/office/drawing/2014/main" val="10001"/>
                   </a:ext>
                 </a:extLst>
               </a:tr>
@@ -20741,7 +20771,7 @@
                 </a:tc>
                 <a:extLst>
                   <a:ext uri="{0D108BD9-81ED-4DB2-BD59-A6C34878D82A}">
-                    <a16:rowId xmlns:a16="http://schemas.microsoft.com/office/drawing/2014/main" xmlns="" val="10002"/>
+                    <a16:rowId xmlns="" xmlns:a16="http://schemas.microsoft.com/office/drawing/2014/main" val="10002"/>
                   </a:ext>
                 </a:extLst>
               </a:tr>
@@ -20794,7 +20824,7 @@
                 </a:tc>
                 <a:extLst>
                   <a:ext uri="{0D108BD9-81ED-4DB2-BD59-A6C34878D82A}">
-                    <a16:rowId xmlns:a16="http://schemas.microsoft.com/office/drawing/2014/main" xmlns="" val="10003"/>
+                    <a16:rowId xmlns="" xmlns:a16="http://schemas.microsoft.com/office/drawing/2014/main" val="10003"/>
                   </a:ext>
                 </a:extLst>
               </a:tr>
@@ -20823,14 +20853,14 @@
                 <a:gridCol w="1197725">
                   <a:extLst>
                     <a:ext uri="{9D8B030D-6E8A-4147-A177-3AD203B41FA5}">
-                      <a16:colId xmlns:a16="http://schemas.microsoft.com/office/drawing/2014/main" xmlns="" val="20000"/>
+                      <a16:colId xmlns="" xmlns:a16="http://schemas.microsoft.com/office/drawing/2014/main" val="20000"/>
                     </a:ext>
                   </a:extLst>
                 </a:gridCol>
                 <a:gridCol w="3271225">
                   <a:extLst>
                     <a:ext uri="{9D8B030D-6E8A-4147-A177-3AD203B41FA5}">
-                      <a16:colId xmlns:a16="http://schemas.microsoft.com/office/drawing/2014/main" xmlns="" val="20001"/>
+                      <a16:colId xmlns="" xmlns:a16="http://schemas.microsoft.com/office/drawing/2014/main" val="20001"/>
                     </a:ext>
                   </a:extLst>
                 </a:gridCol>
@@ -20884,7 +20914,7 @@
                 </a:tc>
                 <a:extLst>
                   <a:ext uri="{0D108BD9-81ED-4DB2-BD59-A6C34878D82A}">
-                    <a16:rowId xmlns:a16="http://schemas.microsoft.com/office/drawing/2014/main" xmlns="" val="10000"/>
+                    <a16:rowId xmlns="" xmlns:a16="http://schemas.microsoft.com/office/drawing/2014/main" val="10000"/>
                   </a:ext>
                 </a:extLst>
               </a:tr>
@@ -20937,7 +20967,7 @@
                 </a:tc>
                 <a:extLst>
                   <a:ext uri="{0D108BD9-81ED-4DB2-BD59-A6C34878D82A}">
-                    <a16:rowId xmlns:a16="http://schemas.microsoft.com/office/drawing/2014/main" xmlns="" val="10001"/>
+                    <a16:rowId xmlns="" xmlns:a16="http://schemas.microsoft.com/office/drawing/2014/main" val="10001"/>
                   </a:ext>
                 </a:extLst>
               </a:tr>
@@ -21002,7 +21032,7 @@
                 </a:tc>
                 <a:extLst>
                   <a:ext uri="{0D108BD9-81ED-4DB2-BD59-A6C34878D82A}">
-                    <a16:rowId xmlns:a16="http://schemas.microsoft.com/office/drawing/2014/main" xmlns="" val="10002"/>
+                    <a16:rowId xmlns="" xmlns:a16="http://schemas.microsoft.com/office/drawing/2014/main" val="10002"/>
                   </a:ext>
                 </a:extLst>
               </a:tr>
@@ -21055,7 +21085,7 @@
                 </a:tc>
                 <a:extLst>
                   <a:ext uri="{0D108BD9-81ED-4DB2-BD59-A6C34878D82A}">
-                    <a16:rowId xmlns:a16="http://schemas.microsoft.com/office/drawing/2014/main" xmlns="" val="10003"/>
+                    <a16:rowId xmlns="" xmlns:a16="http://schemas.microsoft.com/office/drawing/2014/main" val="10003"/>
                   </a:ext>
                 </a:extLst>
               </a:tr>
@@ -21116,14 +21146,14 @@
                 <a:gridCol w="1197725">
                   <a:extLst>
                     <a:ext uri="{9D8B030D-6E8A-4147-A177-3AD203B41FA5}">
-                      <a16:colId xmlns:a16="http://schemas.microsoft.com/office/drawing/2014/main" xmlns="" val="20000"/>
+                      <a16:colId xmlns="" xmlns:a16="http://schemas.microsoft.com/office/drawing/2014/main" val="20000"/>
                     </a:ext>
                   </a:extLst>
                 </a:gridCol>
                 <a:gridCol w="3271225">
                   <a:extLst>
                     <a:ext uri="{9D8B030D-6E8A-4147-A177-3AD203B41FA5}">
-                      <a16:colId xmlns:a16="http://schemas.microsoft.com/office/drawing/2014/main" xmlns="" val="20001"/>
+                      <a16:colId xmlns="" xmlns:a16="http://schemas.microsoft.com/office/drawing/2014/main" val="20001"/>
                     </a:ext>
                   </a:extLst>
                 </a:gridCol>
@@ -21177,7 +21207,7 @@
                 </a:tc>
                 <a:extLst>
                   <a:ext uri="{0D108BD9-81ED-4DB2-BD59-A6C34878D82A}">
-                    <a16:rowId xmlns:a16="http://schemas.microsoft.com/office/drawing/2014/main" xmlns="" val="10000"/>
+                    <a16:rowId xmlns="" xmlns:a16="http://schemas.microsoft.com/office/drawing/2014/main" val="10000"/>
                   </a:ext>
                 </a:extLst>
               </a:tr>
@@ -21230,7 +21260,7 @@
                 </a:tc>
                 <a:extLst>
                   <a:ext uri="{0D108BD9-81ED-4DB2-BD59-A6C34878D82A}">
-                    <a16:rowId xmlns:a16="http://schemas.microsoft.com/office/drawing/2014/main" xmlns="" val="10001"/>
+                    <a16:rowId xmlns="" xmlns:a16="http://schemas.microsoft.com/office/drawing/2014/main" val="10001"/>
                   </a:ext>
                 </a:extLst>
               </a:tr>
@@ -21295,7 +21325,7 @@
                 </a:tc>
                 <a:extLst>
                   <a:ext uri="{0D108BD9-81ED-4DB2-BD59-A6C34878D82A}">
-                    <a16:rowId xmlns:a16="http://schemas.microsoft.com/office/drawing/2014/main" xmlns="" val="10002"/>
+                    <a16:rowId xmlns="" xmlns:a16="http://schemas.microsoft.com/office/drawing/2014/main" val="10002"/>
                   </a:ext>
                 </a:extLst>
               </a:tr>
@@ -21348,7 +21378,7 @@
                 </a:tc>
                 <a:extLst>
                   <a:ext uri="{0D108BD9-81ED-4DB2-BD59-A6C34878D82A}">
-                    <a16:rowId xmlns:a16="http://schemas.microsoft.com/office/drawing/2014/main" xmlns="" val="10003"/>
+                    <a16:rowId xmlns="" xmlns:a16="http://schemas.microsoft.com/office/drawing/2014/main" val="10003"/>
                   </a:ext>
                 </a:extLst>
               </a:tr>
@@ -21377,14 +21407,14 @@
                 <a:gridCol w="1197725">
                   <a:extLst>
                     <a:ext uri="{9D8B030D-6E8A-4147-A177-3AD203B41FA5}">
-                      <a16:colId xmlns:a16="http://schemas.microsoft.com/office/drawing/2014/main" xmlns="" val="20000"/>
+                      <a16:colId xmlns="" xmlns:a16="http://schemas.microsoft.com/office/drawing/2014/main" val="20000"/>
                     </a:ext>
                   </a:extLst>
                 </a:gridCol>
                 <a:gridCol w="3271225">
                   <a:extLst>
                     <a:ext uri="{9D8B030D-6E8A-4147-A177-3AD203B41FA5}">
-                      <a16:colId xmlns:a16="http://schemas.microsoft.com/office/drawing/2014/main" xmlns="" val="20001"/>
+                      <a16:colId xmlns="" xmlns:a16="http://schemas.microsoft.com/office/drawing/2014/main" val="20001"/>
                     </a:ext>
                   </a:extLst>
                 </a:gridCol>
@@ -21438,7 +21468,7 @@
                 </a:tc>
                 <a:extLst>
                   <a:ext uri="{0D108BD9-81ED-4DB2-BD59-A6C34878D82A}">
-                    <a16:rowId xmlns:a16="http://schemas.microsoft.com/office/drawing/2014/main" xmlns="" val="10000"/>
+                    <a16:rowId xmlns="" xmlns:a16="http://schemas.microsoft.com/office/drawing/2014/main" val="10000"/>
                   </a:ext>
                 </a:extLst>
               </a:tr>
@@ -21491,7 +21521,7 @@
                 </a:tc>
                 <a:extLst>
                   <a:ext uri="{0D108BD9-81ED-4DB2-BD59-A6C34878D82A}">
-                    <a16:rowId xmlns:a16="http://schemas.microsoft.com/office/drawing/2014/main" xmlns="" val="10001"/>
+                    <a16:rowId xmlns="" xmlns:a16="http://schemas.microsoft.com/office/drawing/2014/main" val="10001"/>
                   </a:ext>
                 </a:extLst>
               </a:tr>
@@ -21556,7 +21586,7 @@
                 </a:tc>
                 <a:extLst>
                   <a:ext uri="{0D108BD9-81ED-4DB2-BD59-A6C34878D82A}">
-                    <a16:rowId xmlns:a16="http://schemas.microsoft.com/office/drawing/2014/main" xmlns="" val="10002"/>
+                    <a16:rowId xmlns="" xmlns:a16="http://schemas.microsoft.com/office/drawing/2014/main" val="10002"/>
                   </a:ext>
                 </a:extLst>
               </a:tr>
@@ -21609,7 +21639,7 @@
                 </a:tc>
                 <a:extLst>
                   <a:ext uri="{0D108BD9-81ED-4DB2-BD59-A6C34878D82A}">
-                    <a16:rowId xmlns:a16="http://schemas.microsoft.com/office/drawing/2014/main" xmlns="" val="10003"/>
+                    <a16:rowId xmlns="" xmlns:a16="http://schemas.microsoft.com/office/drawing/2014/main" val="10003"/>
                   </a:ext>
                 </a:extLst>
               </a:tr>
@@ -21721,14 +21751,14 @@
                 <a:gridCol w="2353075">
                   <a:extLst>
                     <a:ext uri="{9D8B030D-6E8A-4147-A177-3AD203B41FA5}">
-                      <a16:colId xmlns:a16="http://schemas.microsoft.com/office/drawing/2014/main" xmlns="" val="20000"/>
+                      <a16:colId xmlns="" xmlns:a16="http://schemas.microsoft.com/office/drawing/2014/main" val="20000"/>
                     </a:ext>
                   </a:extLst>
                 </a:gridCol>
                 <a:gridCol w="2353075">
                   <a:extLst>
                     <a:ext uri="{9D8B030D-6E8A-4147-A177-3AD203B41FA5}">
-                      <a16:colId xmlns:a16="http://schemas.microsoft.com/office/drawing/2014/main" xmlns="" val="20001"/>
+                      <a16:colId xmlns="" xmlns:a16="http://schemas.microsoft.com/office/drawing/2014/main" val="20001"/>
                     </a:ext>
                   </a:extLst>
                 </a:gridCol>
@@ -21782,7 +21812,7 @@
                 </a:tc>
                 <a:extLst>
                   <a:ext uri="{0D108BD9-81ED-4DB2-BD59-A6C34878D82A}">
-                    <a16:rowId xmlns:a16="http://schemas.microsoft.com/office/drawing/2014/main" xmlns="" val="10000"/>
+                    <a16:rowId xmlns="" xmlns:a16="http://schemas.microsoft.com/office/drawing/2014/main" val="10000"/>
                   </a:ext>
                 </a:extLst>
               </a:tr>
@@ -21835,7 +21865,7 @@
                 </a:tc>
                 <a:extLst>
                   <a:ext uri="{0D108BD9-81ED-4DB2-BD59-A6C34878D82A}">
-                    <a16:rowId xmlns:a16="http://schemas.microsoft.com/office/drawing/2014/main" xmlns="" val="10001"/>
+                    <a16:rowId xmlns="" xmlns:a16="http://schemas.microsoft.com/office/drawing/2014/main" val="10001"/>
                   </a:ext>
                 </a:extLst>
               </a:tr>
@@ -21888,7 +21918,7 @@
                 </a:tc>
                 <a:extLst>
                   <a:ext uri="{0D108BD9-81ED-4DB2-BD59-A6C34878D82A}">
-                    <a16:rowId xmlns:a16="http://schemas.microsoft.com/office/drawing/2014/main" xmlns="" val="10002"/>
+                    <a16:rowId xmlns="" xmlns:a16="http://schemas.microsoft.com/office/drawing/2014/main" val="10002"/>
                   </a:ext>
                 </a:extLst>
               </a:tr>
@@ -21941,7 +21971,7 @@
                 </a:tc>
                 <a:extLst>
                   <a:ext uri="{0D108BD9-81ED-4DB2-BD59-A6C34878D82A}">
-                    <a16:rowId xmlns:a16="http://schemas.microsoft.com/office/drawing/2014/main" xmlns="" val="10003"/>
+                    <a16:rowId xmlns="" xmlns:a16="http://schemas.microsoft.com/office/drawing/2014/main" val="10003"/>
                   </a:ext>
                 </a:extLst>
               </a:tr>
@@ -21994,7 +22024,7 @@
                 </a:tc>
                 <a:extLst>
                   <a:ext uri="{0D108BD9-81ED-4DB2-BD59-A6C34878D82A}">
-                    <a16:rowId xmlns:a16="http://schemas.microsoft.com/office/drawing/2014/main" xmlns="" val="10004"/>
+                    <a16:rowId xmlns="" xmlns:a16="http://schemas.microsoft.com/office/drawing/2014/main" val="10004"/>
                   </a:ext>
                 </a:extLst>
               </a:tr>
@@ -22023,14 +22053,14 @@
                 <a:gridCol w="2353075">
                   <a:extLst>
                     <a:ext uri="{9D8B030D-6E8A-4147-A177-3AD203B41FA5}">
-                      <a16:colId xmlns:a16="http://schemas.microsoft.com/office/drawing/2014/main" xmlns="" val="20000"/>
+                      <a16:colId xmlns="" xmlns:a16="http://schemas.microsoft.com/office/drawing/2014/main" val="20000"/>
                     </a:ext>
                   </a:extLst>
                 </a:gridCol>
                 <a:gridCol w="2353075">
                   <a:extLst>
                     <a:ext uri="{9D8B030D-6E8A-4147-A177-3AD203B41FA5}">
-                      <a16:colId xmlns:a16="http://schemas.microsoft.com/office/drawing/2014/main" xmlns="" val="20001"/>
+                      <a16:colId xmlns="" xmlns:a16="http://schemas.microsoft.com/office/drawing/2014/main" val="20001"/>
                     </a:ext>
                   </a:extLst>
                 </a:gridCol>
@@ -22084,7 +22114,7 @@
                 </a:tc>
                 <a:extLst>
                   <a:ext uri="{0D108BD9-81ED-4DB2-BD59-A6C34878D82A}">
-                    <a16:rowId xmlns:a16="http://schemas.microsoft.com/office/drawing/2014/main" xmlns="" val="10000"/>
+                    <a16:rowId xmlns="" xmlns:a16="http://schemas.microsoft.com/office/drawing/2014/main" val="10000"/>
                   </a:ext>
                 </a:extLst>
               </a:tr>
@@ -22137,7 +22167,7 @@
                 </a:tc>
                 <a:extLst>
                   <a:ext uri="{0D108BD9-81ED-4DB2-BD59-A6C34878D82A}">
-                    <a16:rowId xmlns:a16="http://schemas.microsoft.com/office/drawing/2014/main" xmlns="" val="10001"/>
+                    <a16:rowId xmlns="" xmlns:a16="http://schemas.microsoft.com/office/drawing/2014/main" val="10001"/>
                   </a:ext>
                 </a:extLst>
               </a:tr>
@@ -22190,7 +22220,7 @@
                 </a:tc>
                 <a:extLst>
                   <a:ext uri="{0D108BD9-81ED-4DB2-BD59-A6C34878D82A}">
-                    <a16:rowId xmlns:a16="http://schemas.microsoft.com/office/drawing/2014/main" xmlns="" val="10002"/>
+                    <a16:rowId xmlns="" xmlns:a16="http://schemas.microsoft.com/office/drawing/2014/main" val="10002"/>
                   </a:ext>
                 </a:extLst>
               </a:tr>
@@ -22243,7 +22273,7 @@
                 </a:tc>
                 <a:extLst>
                   <a:ext uri="{0D108BD9-81ED-4DB2-BD59-A6C34878D82A}">
-                    <a16:rowId xmlns:a16="http://schemas.microsoft.com/office/drawing/2014/main" xmlns="" val="10003"/>
+                    <a16:rowId xmlns="" xmlns:a16="http://schemas.microsoft.com/office/drawing/2014/main" val="10003"/>
                   </a:ext>
                 </a:extLst>
               </a:tr>
@@ -22296,7 +22326,7 @@
                 </a:tc>
                 <a:extLst>
                   <a:ext uri="{0D108BD9-81ED-4DB2-BD59-A6C34878D82A}">
-                    <a16:rowId xmlns:a16="http://schemas.microsoft.com/office/drawing/2014/main" xmlns="" val="10004"/>
+                    <a16:rowId xmlns="" xmlns:a16="http://schemas.microsoft.com/office/drawing/2014/main" val="10004"/>
                   </a:ext>
                 </a:extLst>
               </a:tr>
@@ -22357,14 +22387,14 @@
                 <a:gridCol w="2353075">
                   <a:extLst>
                     <a:ext uri="{9D8B030D-6E8A-4147-A177-3AD203B41FA5}">
-                      <a16:colId xmlns:a16="http://schemas.microsoft.com/office/drawing/2014/main" xmlns="" val="20000"/>
+                      <a16:colId xmlns="" xmlns:a16="http://schemas.microsoft.com/office/drawing/2014/main" val="20000"/>
                     </a:ext>
                   </a:extLst>
                 </a:gridCol>
                 <a:gridCol w="2353075">
                   <a:extLst>
                     <a:ext uri="{9D8B030D-6E8A-4147-A177-3AD203B41FA5}">
-                      <a16:colId xmlns:a16="http://schemas.microsoft.com/office/drawing/2014/main" xmlns="" val="20001"/>
+                      <a16:colId xmlns="" xmlns:a16="http://schemas.microsoft.com/office/drawing/2014/main" val="20001"/>
                     </a:ext>
                   </a:extLst>
                 </a:gridCol>
@@ -22418,7 +22448,7 @@
                 </a:tc>
                 <a:extLst>
                   <a:ext uri="{0D108BD9-81ED-4DB2-BD59-A6C34878D82A}">
-                    <a16:rowId xmlns:a16="http://schemas.microsoft.com/office/drawing/2014/main" xmlns="" val="10000"/>
+                    <a16:rowId xmlns="" xmlns:a16="http://schemas.microsoft.com/office/drawing/2014/main" val="10000"/>
                   </a:ext>
                 </a:extLst>
               </a:tr>
@@ -22471,7 +22501,7 @@
                 </a:tc>
                 <a:extLst>
                   <a:ext uri="{0D108BD9-81ED-4DB2-BD59-A6C34878D82A}">
-                    <a16:rowId xmlns:a16="http://schemas.microsoft.com/office/drawing/2014/main" xmlns="" val="10001"/>
+                    <a16:rowId xmlns="" xmlns:a16="http://schemas.microsoft.com/office/drawing/2014/main" val="10001"/>
                   </a:ext>
                 </a:extLst>
               </a:tr>
@@ -22524,7 +22554,7 @@
                 </a:tc>
                 <a:extLst>
                   <a:ext uri="{0D108BD9-81ED-4DB2-BD59-A6C34878D82A}">
-                    <a16:rowId xmlns:a16="http://schemas.microsoft.com/office/drawing/2014/main" xmlns="" val="10002"/>
+                    <a16:rowId xmlns="" xmlns:a16="http://schemas.microsoft.com/office/drawing/2014/main" val="10002"/>
                   </a:ext>
                 </a:extLst>
               </a:tr>
@@ -22577,7 +22607,7 @@
                 </a:tc>
                 <a:extLst>
                   <a:ext uri="{0D108BD9-81ED-4DB2-BD59-A6C34878D82A}">
-                    <a16:rowId xmlns:a16="http://schemas.microsoft.com/office/drawing/2014/main" xmlns="" val="10003"/>
+                    <a16:rowId xmlns="" xmlns:a16="http://schemas.microsoft.com/office/drawing/2014/main" val="10003"/>
                   </a:ext>
                 </a:extLst>
               </a:tr>
@@ -22630,7 +22660,7 @@
                 </a:tc>
                 <a:extLst>
                   <a:ext uri="{0D108BD9-81ED-4DB2-BD59-A6C34878D82A}">
-                    <a16:rowId xmlns:a16="http://schemas.microsoft.com/office/drawing/2014/main" xmlns="" val="10004"/>
+                    <a16:rowId xmlns="" xmlns:a16="http://schemas.microsoft.com/office/drawing/2014/main" val="10004"/>
                   </a:ext>
                 </a:extLst>
               </a:tr>

</xml_diff>